<commit_message>
aggiunto CKEditor al powerpoint
</commit_message>
<xml_diff>
--- a/slide.pptx
+++ b/slide.pptx
@@ -3747,9 +3747,10 @@
               <a:t>Furri</a:t>
             </a:r>
             <a:r>
-              <a:rPr lang="en-US" sz="2000" dirty="0"/>
-              <a:t> Geremia</a:t>
-            </a:r>
+              <a:rPr lang="en-US" sz="2000"/>
+              <a:t> Geremia VR504878</a:t>
+            </a:r>
+            <a:endParaRPr lang="en-US" sz="2000" dirty="0"/>
           </a:p>
         </p:txBody>
       </p:sp>
@@ -7666,6 +7667,20 @@
             <a:r>
               <a:rPr lang="it-IT" sz="2400" dirty="0"/>
               <a:t>È possibile inserire nelle risposte possibili alle singole domande l’opzione «non rispondo»</a:t>
+            </a:r>
+          </a:p>
+          <a:p>
+            <a:r>
+              <a:rPr lang="it-IT" sz="2400" dirty="0"/>
+              <a:t>Abbiamo utilizzato </a:t>
+            </a:r>
+            <a:r>
+              <a:rPr lang="it-IT" sz="2400" dirty="0" err="1"/>
+              <a:t>CKEditor</a:t>
+            </a:r>
+            <a:r>
+              <a:rPr lang="it-IT" sz="2400" dirty="0"/>
+              <a:t> per dare la possibilità ai medici di personalizzare la pagina delle domande</a:t>
             </a:r>
           </a:p>
           <a:p>

</xml_diff>